<commit_message>
Added more sample docs
</commit_message>
<xml_diff>
--- a/Sample-Docs/test2.pptx
+++ b/Sample-Docs/test2.pptx
@@ -317,7 +317,7 @@
           <a:p>
             <a:fld id="{4E087215-0C8F-4762-A664-737A353EC9A4}" type="datetimeFigureOut">
               <a:rPr lang="bg-BG" smtClean="0"/>
-              <a:t>12.11.2019 г.</a:t>
+              <a:t>3.11.2023 г.</a:t>
             </a:fld>
             <a:endParaRPr lang="bg-BG"/>
           </a:p>
@@ -494,7 +494,7 @@
           <a:p>
             <a:fld id="{72D84649-876A-46C9-8472-14CB09C070D8}" type="datetimeFigureOut">
               <a:rPr lang="en-US" smtClean="0"/>
-              <a:t>12-Nov-19</a:t>
+              <a:t>3-Nov-23</a:t>
             </a:fld>
             <a:endParaRPr lang="en-US" dirty="0"/>
           </a:p>
@@ -3870,7 +3870,7 @@
             <a:fld id="{055373AC-9AA7-423B-BA00-BA1C74164DBD}" type="datetime1">
               <a:rPr lang="en-US" smtClean="0"/>
               <a:pPr/>
-              <a:t>12-Nov-19</a:t>
+              <a:t>3-Nov-23</a:t>
             </a:fld>
             <a:endParaRPr lang="en-US" dirty="0"/>
           </a:p>
@@ -4348,7 +4348,7 @@
             <a:fld id="{055373AC-9AA7-423B-BA00-BA1C74164DBD}" type="datetime1">
               <a:rPr lang="en-US" smtClean="0"/>
               <a:pPr/>
-              <a:t>12-Nov-19</a:t>
+              <a:t>3-Nov-23</a:t>
             </a:fld>
             <a:endParaRPr lang="en-US" dirty="0"/>
           </a:p>
@@ -5706,7 +5706,7 @@
             <a:fld id="{055373AC-9AA7-423B-BA00-BA1C74164DBD}" type="datetime1">
               <a:rPr lang="en-US" smtClean="0"/>
               <a:pPr/>
-              <a:t>12-Nov-19</a:t>
+              <a:t>3-Nov-23</a:t>
             </a:fld>
             <a:endParaRPr lang="en-US" dirty="0"/>
           </a:p>
@@ -7526,7 +7526,7 @@
             <a:fld id="{055373AC-9AA7-423B-BA00-BA1C74164DBD}" type="datetime1">
               <a:rPr lang="en-US" smtClean="0"/>
               <a:pPr/>
-              <a:t>12-Nov-19</a:t>
+              <a:t>3-Nov-23</a:t>
             </a:fld>
             <a:endParaRPr lang="en-US" dirty="0"/>
           </a:p>
@@ -7963,7 +7963,7 @@
             <a:fld id="{055373AC-9AA7-423B-BA00-BA1C74164DBD}" type="datetime1">
               <a:rPr lang="en-US" smtClean="0"/>
               <a:pPr/>
-              <a:t>12-Nov-19</a:t>
+              <a:t>3-Nov-23</a:t>
             </a:fld>
             <a:endParaRPr lang="en-US" dirty="0"/>
           </a:p>
@@ -8677,7 +8677,7 @@
             <a:fld id="{055373AC-9AA7-423B-BA00-BA1C74164DBD}" type="datetime1">
               <a:rPr lang="en-US" smtClean="0"/>
               <a:pPr/>
-              <a:t>12-Nov-19</a:t>
+              <a:t>3-Nov-23</a:t>
             </a:fld>
             <a:endParaRPr lang="en-US" dirty="0"/>
           </a:p>
@@ -9088,7 +9088,7 @@
             <a:fld id="{055373AC-9AA7-423B-BA00-BA1C74164DBD}" type="datetime1">
               <a:rPr lang="en-US" smtClean="0"/>
               <a:pPr/>
-              <a:t>12-Nov-19</a:t>
+              <a:t>3-Nov-23</a:t>
             </a:fld>
             <a:endParaRPr lang="en-US" dirty="0"/>
           </a:p>
@@ -9457,7 +9457,7 @@
             <a:fld id="{055373AC-9AA7-423B-BA00-BA1C74164DBD}" type="datetime1">
               <a:rPr lang="en-US" smtClean="0"/>
               <a:pPr/>
-              <a:t>12-Nov-19</a:t>
+              <a:t>3-Nov-23</a:t>
             </a:fld>
             <a:endParaRPr lang="en-US" dirty="0"/>
           </a:p>
@@ -10125,7 +10125,7 @@
             <a:fld id="{055373AC-9AA7-423B-BA00-BA1C74164DBD}" type="datetime1">
               <a:rPr lang="en-US" smtClean="0"/>
               <a:pPr/>
-              <a:t>12-Nov-19</a:t>
+              <a:t>3-Nov-23</a:t>
             </a:fld>
             <a:endParaRPr lang="en-US" dirty="0"/>
           </a:p>
@@ -10586,7 +10586,7 @@
             <a:fld id="{055373AC-9AA7-423B-BA00-BA1C74164DBD}" type="datetime1">
               <a:rPr lang="en-US" smtClean="0"/>
               <a:pPr/>
-              <a:t>12-Nov-19</a:t>
+              <a:t>3-Nov-23</a:t>
             </a:fld>
             <a:endParaRPr lang="en-US" dirty="0"/>
           </a:p>
@@ -10770,7 +10770,7 @@
             <a:fld id="{055373AC-9AA7-423B-BA00-BA1C74164DBD}" type="datetime1">
               <a:rPr lang="en-US" smtClean="0"/>
               <a:pPr/>
-              <a:t>12-Nov-19</a:t>
+              <a:t>3-Nov-23</a:t>
             </a:fld>
             <a:endParaRPr lang="en-US" dirty="0"/>
           </a:p>
@@ -12650,13 +12650,13 @@
         </p:nvSpPr>
         <p:spPr bwMode="auto">
           <a:xfrm>
-            <a:off x="4540153" y="5548547"/>
-            <a:ext cx="3914530" cy="583811"/>
+            <a:off x="4811151" y="5661875"/>
+            <a:ext cx="3415793" cy="583811"/>
           </a:xfrm>
           <a:prstGeom prst="wedgeRoundRectCallout">
             <a:avLst>
-              <a:gd name="adj1" fmla="val -22853"/>
-              <a:gd name="adj2" fmla="val 45632"/>
+              <a:gd name="adj1" fmla="val -59953"/>
+              <a:gd name="adj2" fmla="val -26232"/>
               <a:gd name="adj3" fmla="val 16667"/>
             </a:avLst>
           </a:prstGeom>
@@ -13117,12 +13117,8 @@
           <a:lstStyle/>
           <a:p>
             <a:r>
-              <a:rPr lang="en-US" dirty="0"/>
-              <a:t>Problem: </a:t>
-            </a:r>
-            <a:r>
               <a:rPr lang="en-US"/>
-              <a:t>Multiply Number by Two</a:t>
+              <a:t>Problem: Multiply Number by Two</a:t>
             </a:r>
             <a:endParaRPr lang="bg-BG" dirty="0"/>
           </a:p>
@@ -16834,8 +16830,8 @@
           </a:xfrm>
           <a:prstGeom prst="wedgeRoundRectCallout">
             <a:avLst>
-              <a:gd name="adj1" fmla="val -18844"/>
-              <a:gd name="adj2" fmla="val 44521"/>
+              <a:gd name="adj1" fmla="val -90224"/>
+              <a:gd name="adj2" fmla="val -16274"/>
               <a:gd name="adj3" fmla="val 16667"/>
             </a:avLst>
           </a:prstGeom>
@@ -16898,7 +16894,10 @@
             <a:r>
               <a:rPr lang="en-US" sz="2800" b="1" dirty="0">
                 <a:solidFill>
-                  <a:schemeClr val="bg1"/>
+                  <a:schemeClr val="bg1">
+                    <a:lumMod val="60000"/>
+                    <a:lumOff val="40000"/>
+                  </a:schemeClr>
                 </a:solidFill>
                 <a:effectLst>
                   <a:outerShdw blurRad="38100" dist="38100" dir="2700000" algn="tl">
@@ -17061,13 +17060,13 @@
         </p:nvSpPr>
         <p:spPr bwMode="auto">
           <a:xfrm>
-            <a:off x="6917534" y="4992058"/>
-            <a:ext cx="4863287" cy="1023732"/>
+            <a:off x="6898787" y="4896911"/>
+            <a:ext cx="3420565" cy="1500285"/>
           </a:xfrm>
           <a:prstGeom prst="wedgeRoundRectCallout">
             <a:avLst>
-              <a:gd name="adj1" fmla="val -18844"/>
-              <a:gd name="adj2" fmla="val 44521"/>
+              <a:gd name="adj1" fmla="val -68476"/>
+              <a:gd name="adj2" fmla="val -23410"/>
               <a:gd name="adj3" fmla="val 16667"/>
             </a:avLst>
           </a:prstGeom>
@@ -17125,7 +17124,25 @@
                   </a:outerShdw>
                 </a:effectLst>
               </a:rPr>
-              <a:t>Continue on the </a:t>
+              <a:t>Continue with the </a:t>
+            </a:r>
+            <a:r>
+              <a:rPr lang="en-US" sz="2800" b="1" dirty="0">
+                <a:solidFill>
+                  <a:schemeClr val="bg1">
+                    <a:lumMod val="60000"/>
+                    <a:lumOff val="40000"/>
+                  </a:schemeClr>
+                </a:solidFill>
+                <a:effectLst>
+                  <a:outerShdw blurRad="38100" dist="38100" dir="2700000" algn="tl">
+                    <a:srgbClr val="000000">
+                      <a:alpha val="43137"/>
+                    </a:srgbClr>
+                  </a:outerShdw>
+                </a:effectLst>
+              </a:rPr>
+              <a:t>next</a:t>
             </a:r>
             <a:r>
               <a:rPr lang="en-US" sz="2800" b="1" dirty="0">
@@ -17140,7 +17157,25 @@
                   </a:outerShdw>
                 </a:effectLst>
               </a:rPr>
-              <a:t>next condition</a:t>
+              <a:t> </a:t>
+            </a:r>
+            <a:r>
+              <a:rPr lang="en-US" sz="2800" b="1" dirty="0">
+                <a:solidFill>
+                  <a:schemeClr val="bg1">
+                    <a:lumMod val="60000"/>
+                    <a:lumOff val="40000"/>
+                  </a:schemeClr>
+                </a:solidFill>
+                <a:effectLst>
+                  <a:outerShdw blurRad="38100" dist="38100" dir="2700000" algn="tl">
+                    <a:srgbClr val="000000">
+                      <a:alpha val="43137"/>
+                    </a:srgbClr>
+                  </a:outerShdw>
+                </a:effectLst>
+              </a:rPr>
+              <a:t>condition</a:t>
             </a:r>
             <a:r>
               <a:rPr lang="en-US" sz="2800" b="1" dirty="0">
@@ -17160,7 +17195,10 @@
             <a:r>
               <a:rPr lang="en-US" sz="2800" b="1" dirty="0">
                 <a:solidFill>
-                  <a:schemeClr val="bg1"/>
+                  <a:schemeClr val="bg1">
+                    <a:lumMod val="60000"/>
+                    <a:lumOff val="40000"/>
+                  </a:schemeClr>
                 </a:solidFill>
                 <a:effectLst>
                   <a:outerShdw blurRad="38100" dist="38100" dir="2700000" algn="tl">
@@ -17174,7 +17212,10 @@
             </a:r>
             <a:endParaRPr lang="bg-BG" sz="2800" b="1" dirty="0">
               <a:solidFill>
-                <a:schemeClr val="bg1"/>
+                <a:schemeClr val="bg1">
+                  <a:lumMod val="60000"/>
+                  <a:lumOff val="40000"/>
+                </a:schemeClr>
               </a:solidFill>
               <a:effectLst>
                 <a:outerShdw blurRad="38100" dist="38100" dir="2700000" algn="tl">
@@ -17480,7 +17521,7 @@
             </a:r>
             <a:r>
               <a:rPr lang="en-US" dirty="0"/>
-              <a:t>and checks if </a:t>
+              <a:t>and checks if</a:t>
             </a:r>
             <a:br>
               <a:rPr lang="en-US" dirty="0"/>
@@ -19177,7 +19218,7 @@
                 <a:latin typeface="Consolas" panose="020B0609020204030204" pitchFamily="49" charset="0"/>
                 <a:cs typeface="Courier New" panose="02070309020205020404" pitchFamily="49" charset="0"/>
               </a:rPr>
-              <a:t>//TODO</a:t>
+              <a:t>// TODO</a:t>
             </a:r>
           </a:p>
           <a:p>
@@ -19221,7 +19262,7 @@
                 <a:latin typeface="Consolas" panose="020B0609020204030204" pitchFamily="49" charset="0"/>
                 <a:cs typeface="Courier New" panose="02070309020205020404" pitchFamily="49" charset="0"/>
               </a:rPr>
-              <a:t>//TODO</a:t>
+              <a:t>// TODO</a:t>
             </a:r>
           </a:p>
           <a:p>
@@ -20022,7 +20063,7 @@
               <a:rPr lang="en-US" altLang="bg-BG" sz="2200" b="1" dirty="0">
                 <a:latin typeface="Consolas" panose="020B0609020204030204" pitchFamily="49" charset="0"/>
               </a:rPr>
-              <a:t>++)</a:t>
+              <a:t>++) </a:t>
             </a:r>
             <a:r>
               <a:rPr lang="en-US" altLang="bg-BG" sz="2200" b="1" dirty="0">
@@ -20313,8 +20354,8 @@
           </a:xfrm>
           <a:prstGeom prst="wedgeRoundRectCallout">
             <a:avLst>
-              <a:gd name="adj1" fmla="val -41346"/>
-              <a:gd name="adj2" fmla="val 16089"/>
+              <a:gd name="adj1" fmla="val -70937"/>
+              <a:gd name="adj2" fmla="val -25590"/>
               <a:gd name="adj3" fmla="val 16667"/>
             </a:avLst>
           </a:prstGeom>
@@ -20377,6 +20418,24 @@
             <a:r>
               <a:rPr lang="en-US" sz="2800" b="1" dirty="0">
                 <a:solidFill>
+                  <a:schemeClr val="bg1">
+                    <a:lumMod val="60000"/>
+                    <a:lumOff val="40000"/>
+                  </a:schemeClr>
+                </a:solidFill>
+                <a:effectLst>
+                  <a:outerShdw blurRad="38100" dist="38100" dir="2700000" algn="tl">
+                    <a:srgbClr val="000000">
+                      <a:alpha val="43137"/>
+                    </a:srgbClr>
+                  </a:outerShdw>
+                </a:effectLst>
+              </a:rPr>
+              <a:t>in</a:t>
+            </a:r>
+            <a:r>
+              <a:rPr lang="en-US" sz="2800" b="1" dirty="0">
+                <a:solidFill>
                   <a:schemeClr val="bg1"/>
                 </a:solidFill>
                 <a:effectLst>
@@ -20387,7 +20446,7 @@
                   </a:outerShdw>
                 </a:effectLst>
               </a:rPr>
-              <a:t>in </a:t>
+              <a:t> </a:t>
             </a:r>
             <a:r>
               <a:rPr lang="en-US" sz="2800" b="1" dirty="0">
@@ -20433,13 +20492,13 @@
         </p:nvSpPr>
         <p:spPr bwMode="auto">
           <a:xfrm>
-            <a:off x="7034674" y="5098784"/>
-            <a:ext cx="3235569" cy="1298412"/>
+            <a:off x="6762739" y="5131398"/>
+            <a:ext cx="3604639" cy="1082918"/>
           </a:xfrm>
           <a:prstGeom prst="wedgeRoundRectCallout">
             <a:avLst>
-              <a:gd name="adj1" fmla="val -48627"/>
-              <a:gd name="adj2" fmla="val 17683"/>
+              <a:gd name="adj1" fmla="val -74561"/>
+              <a:gd name="adj2" fmla="val -22915"/>
               <a:gd name="adj3" fmla="val 16667"/>
             </a:avLst>
           </a:prstGeom>
@@ -20495,7 +20554,10 @@
             <a:r>
               <a:rPr lang="en-US" sz="2800" b="1" dirty="0">
                 <a:solidFill>
-                  <a:schemeClr val="bg1"/>
+                  <a:schemeClr val="bg1">
+                    <a:lumMod val="60000"/>
+                    <a:lumOff val="40000"/>
+                  </a:schemeClr>
                 </a:solidFill>
               </a:rPr>
               <a:t>outside</a:t>
@@ -25081,8 +25143,8 @@
         </p:blipFill>
         <p:spPr>
           <a:xfrm>
-            <a:off x="5304196" y="1611150"/>
-            <a:ext cx="6262216" cy="3851599"/>
+            <a:off x="4958811" y="1418570"/>
+            <a:ext cx="6888438" cy="4236759"/>
           </a:xfrm>
           <a:prstGeom prst="rect">
             <a:avLst/>
@@ -26676,7 +26738,10 @@
             <a:r>
               <a:rPr lang="en-US" sz="2800" b="1" dirty="0">
                 <a:solidFill>
-                  <a:schemeClr val="bg1"/>
+                  <a:schemeClr val="bg1">
+                    <a:lumMod val="60000"/>
+                    <a:lumOff val="40000"/>
+                  </a:schemeClr>
                 </a:solidFill>
                 <a:latin typeface="Malgun Gothic (Body)"/>
               </a:rPr>
@@ -26701,7 +26766,10 @@
             <a:r>
               <a:rPr lang="en-US" sz="2800" b="1" dirty="0">
                 <a:solidFill>
-                  <a:schemeClr val="bg1"/>
+                  <a:schemeClr val="bg1">
+                    <a:lumMod val="60000"/>
+                    <a:lumOff val="40000"/>
+                  </a:schemeClr>
                 </a:solidFill>
                 <a:latin typeface="Malgun Gothic (Body)"/>
               </a:rPr>
@@ -26752,7 +26820,10 @@
             <a:r>
               <a:rPr lang="en-US" sz="2800" b="1" dirty="0">
                 <a:solidFill>
-                  <a:schemeClr val="bg1"/>
+                  <a:schemeClr val="bg1">
+                    <a:lumMod val="60000"/>
+                    <a:lumOff val="40000"/>
+                  </a:schemeClr>
                 </a:solidFill>
                 <a:latin typeface="Malgun Gothic (Body)"/>
               </a:rPr>
@@ -26795,7 +26866,10 @@
             <a:r>
               <a:rPr lang="en-US" sz="2800" b="1" dirty="0">
                 <a:solidFill>
-                  <a:schemeClr val="bg1"/>
+                  <a:schemeClr val="bg1">
+                    <a:lumMod val="60000"/>
+                    <a:lumOff val="40000"/>
+                  </a:schemeClr>
                 </a:solidFill>
                 <a:latin typeface="Malgun Gothic (Body)"/>
               </a:rPr>

</xml_diff>